<commit_message>
Now in ChildWindowViewModel there is dependencies that dependends on context. They are more deeper from ChildWindowViewModel. So registration and resolving became even more complex.
</commit_message>
<xml_diff>
--- a/Slides.pptx
+++ b/Slides.pptx
@@ -7,6 +7,7 @@
   <p:sldIdLst>
     <p:sldId id="256" r:id="rId2"/>
     <p:sldId id="257" r:id="rId3"/>
+    <p:sldId id="258" r:id="rId4"/>
   </p:sldIdLst>
   <p:sldSz cx="9144000" cy="6858000" type="screen4x3"/>
   <p:notesSz cx="6858000" cy="9144000"/>
@@ -3307,6 +3308,93 @@
     <p:extLst>
       <p:ext uri="{BB962C8B-B14F-4D97-AF65-F5344CB8AC3E}">
         <p14:creationId xmlns:p14="http://schemas.microsoft.com/office/powerpoint/2010/main" val="2149901437"/>
+      </p:ext>
+    </p:extLst>
+  </p:cSld>
+  <p:clrMapOvr>
+    <a:masterClrMapping/>
+  </p:clrMapOvr>
+</p:sld>
+</file>
+
+<file path=ppt/slides/slide3.xml><?xml version="1.0" encoding="utf-8"?>
+<p:sld xmlns:a="http://schemas.openxmlformats.org/drawingml/2006/main" xmlns:r="http://schemas.openxmlformats.org/officeDocument/2006/relationships" xmlns:p="http://schemas.openxmlformats.org/presentationml/2006/main">
+  <p:cSld>
+    <p:spTree>
+      <p:nvGrpSpPr>
+        <p:cNvPr id="1" name=""/>
+        <p:cNvGrpSpPr/>
+        <p:nvPr/>
+      </p:nvGrpSpPr>
+      <p:grpSpPr>
+        <a:xfrm>
+          <a:off x="0" y="0"/>
+          <a:ext cx="0" cy="0"/>
+          <a:chOff x="0" y="0"/>
+          <a:chExt cx="0" cy="0"/>
+        </a:xfrm>
+      </p:grpSpPr>
+      <p:sp>
+        <p:nvSpPr>
+          <p:cNvPr id="2" name="Title 1"/>
+          <p:cNvSpPr>
+            <a:spLocks noGrp="1"/>
+          </p:cNvSpPr>
+          <p:nvPr>
+            <p:ph type="title"/>
+          </p:nvPr>
+        </p:nvSpPr>
+        <p:spPr/>
+        <p:txBody>
+          <a:bodyPr/>
+          <a:lstStyle/>
+          <a:p>
+            <a:r>
+              <a:rPr lang="ru-RU" dirty="0" smtClean="0"/>
+              <a:t>Вложенные скоупы</a:t>
+            </a:r>
+            <a:endParaRPr lang="ru-RU" dirty="0"/>
+          </a:p>
+        </p:txBody>
+      </p:sp>
+      <p:sp>
+        <p:nvSpPr>
+          <p:cNvPr id="3" name="Content Placeholder 2"/>
+          <p:cNvSpPr>
+            <a:spLocks noGrp="1"/>
+          </p:cNvSpPr>
+          <p:nvPr>
+            <p:ph idx="1"/>
+          </p:nvPr>
+        </p:nvSpPr>
+        <p:spPr/>
+        <p:txBody>
+          <a:bodyPr/>
+          <a:lstStyle/>
+          <a:p>
+            <a:pPr marL="0" indent="0">
+              <a:buNone/>
+            </a:pPr>
+            <a:r>
+              <a:rPr lang="ru-RU" dirty="0" smtClean="0"/>
+              <a:t>Пришли новые требования: теперь </a:t>
+            </a:r>
+            <a:r>
+              <a:rPr lang="en-US" dirty="0" err="1" smtClean="0"/>
+              <a:t>HeaderViewModel</a:t>
+            </a:r>
+            <a:r>
+              <a:rPr lang="ru-RU" smtClean="0"/>
+              <a:t> должен вести себя по-разному, в зависимости от ввода пользователя.</a:t>
+            </a:r>
+            <a:endParaRPr lang="ru-RU" dirty="0"/>
+          </a:p>
+        </p:txBody>
+      </p:sp>
+    </p:spTree>
+    <p:extLst>
+      <p:ext uri="{BB962C8B-B14F-4D97-AF65-F5344CB8AC3E}">
+        <p14:creationId xmlns:p14="http://schemas.microsoft.com/office/powerpoint/2010/main" val="1109283116"/>
       </p:ext>
     </p:extLst>
   </p:cSld>

</xml_diff>

<commit_message>
Add description in expamle 2 about bad child scopes scenario
</commit_message>
<xml_diff>
--- a/Slides.pptx
+++ b/Slides.pptx
@@ -3346,12 +3346,33 @@
         </p:nvSpPr>
         <p:spPr/>
         <p:txBody>
-          <a:bodyPr/>
+          <a:bodyPr>
+            <a:normAutofit fontScale="90000"/>
+          </a:bodyPr>
           <a:lstStyle/>
           <a:p>
             <a:r>
               <a:rPr lang="ru-RU" dirty="0" smtClean="0"/>
-              <a:t>Вложенные скоупы</a:t>
+              <a:t>Вложенные </a:t>
+            </a:r>
+            <a:r>
+              <a:rPr lang="ru-RU" dirty="0" smtClean="0"/>
+              <a:t>скоупы</a:t>
+            </a:r>
+            <a:r>
+              <a:rPr lang="en-US" dirty="0" smtClean="0"/>
+              <a:t/>
+            </a:r>
+            <a:br>
+              <a:rPr lang="en-US" dirty="0" smtClean="0"/>
+            </a:br>
+            <a:r>
+              <a:rPr lang="en-US" dirty="0" smtClean="0"/>
+              <a:t>(</a:t>
+            </a:r>
+            <a:r>
+              <a:rPr lang="ru-RU" dirty="0" smtClean="0"/>
+              <a:t>пример 2)</a:t>
             </a:r>
             <a:endParaRPr lang="ru-RU" dirty="0"/>
           </a:p>
@@ -3369,7 +3390,9 @@
         </p:nvSpPr>
         <p:spPr/>
         <p:txBody>
-          <a:bodyPr/>
+          <a:bodyPr>
+            <a:normAutofit fontScale="85000" lnSpcReduction="20000"/>
+          </a:bodyPr>
           <a:lstStyle/>
           <a:p>
             <a:pPr marL="0" indent="0">
@@ -3384,8 +3407,48 @@
               <a:t>HeaderViewModel</a:t>
             </a:r>
             <a:r>
+              <a:rPr lang="ru-RU" dirty="0" smtClean="0"/>
+              <a:t> должен вести себя по-разному, в зависимости от ввода пользователя</a:t>
+            </a:r>
+            <a:r>
+              <a:rPr lang="ru-RU" dirty="0" smtClean="0"/>
+              <a:t>. Теперь </a:t>
+            </a:r>
+            <a:r>
+              <a:rPr lang="en-US" dirty="0" err="1" smtClean="0"/>
+              <a:t>HeaderViewModel</a:t>
+            </a:r>
+            <a:r>
+              <a:rPr lang="en-US" dirty="0" smtClean="0"/>
+              <a:t> </a:t>
+            </a:r>
+            <a:r>
+              <a:rPr lang="ru-RU" dirty="0" smtClean="0"/>
+              <a:t>не хранит в себе текст. Чтобы поддержать принцип единственной ответственности, мы разместили текст в </a:t>
+            </a:r>
+            <a:r>
+              <a:rPr lang="en-US" dirty="0" err="1" smtClean="0"/>
+              <a:t>HeaderTextProvider</a:t>
+            </a:r>
+            <a:r>
+              <a:rPr lang="ru-RU" dirty="0" smtClean="0"/>
+              <a:t>. Также мы сделали </a:t>
+            </a:r>
+            <a:r>
+              <a:rPr lang="en-US" dirty="0" err="1" smtClean="0"/>
+              <a:t>HeaderTextFormatter</a:t>
+            </a:r>
+            <a:r>
+              <a:rPr lang="ru-RU" dirty="0" smtClean="0"/>
+              <a:t>, который делает общую обработку текста и использует специфические форматеры, которые определяются вводом пользователя. Таким образом контекстно-зависимые компоненты распологаются глубоко относительно </a:t>
+            </a:r>
+            <a:r>
+              <a:rPr lang="en-US" dirty="0" err="1" smtClean="0"/>
+              <a:t>ChildWindowViewModel</a:t>
+            </a:r>
+            <a:r>
               <a:rPr lang="ru-RU" smtClean="0"/>
-              <a:t> должен вести себя по-разному, в зависимости от ввода пользователя.</a:t>
+              <a:t> и поэтому создание ее экземпляра становится очень сложным.</a:t>
             </a:r>
             <a:endParaRPr lang="ru-RU" dirty="0"/>
           </a:p>

</xml_diff>

<commit_message>
Add example 2 description to presentation. Add planning pages.
</commit_message>
<xml_diff>
--- a/Slides.pptx
+++ b/Slides.pptx
@@ -7,7 +7,13 @@
   <p:sldIdLst>
     <p:sldId id="256" r:id="rId2"/>
     <p:sldId id="257" r:id="rId3"/>
-    <p:sldId id="258" r:id="rId4"/>
+    <p:sldId id="259" r:id="rId4"/>
+    <p:sldId id="258" r:id="rId5"/>
+    <p:sldId id="260" r:id="rId6"/>
+    <p:sldId id="261" r:id="rId7"/>
+    <p:sldId id="262" r:id="rId8"/>
+    <p:sldId id="263" r:id="rId9"/>
+    <p:sldId id="264" r:id="rId10"/>
   </p:sldIdLst>
   <p:sldSz cx="9144000" cy="6858000" type="screen4x3"/>
   <p:notesSz cx="6858000" cy="9144000"/>
@@ -291,7 +297,7 @@
             <a:fld id="{1D8BD707-D9CF-40AE-B4C6-C98DA3205C09}" type="datetimeFigureOut">
               <a:rPr lang="en-US" smtClean="0"/>
               <a:pPr/>
-              <a:t>12/27/2016</a:t>
+              <a:t>12/28/2016</a:t>
             </a:fld>
             <a:endParaRPr lang="en-US"/>
           </a:p>
@@ -458,7 +464,7 @@
             <a:fld id="{1D8BD707-D9CF-40AE-B4C6-C98DA3205C09}" type="datetimeFigureOut">
               <a:rPr lang="en-US" smtClean="0"/>
               <a:pPr/>
-              <a:t>12/27/2016</a:t>
+              <a:t>12/28/2016</a:t>
             </a:fld>
             <a:endParaRPr lang="en-US"/>
           </a:p>
@@ -635,7 +641,7 @@
             <a:fld id="{1D8BD707-D9CF-40AE-B4C6-C98DA3205C09}" type="datetimeFigureOut">
               <a:rPr lang="en-US" smtClean="0"/>
               <a:pPr/>
-              <a:t>12/27/2016</a:t>
+              <a:t>12/28/2016</a:t>
             </a:fld>
             <a:endParaRPr lang="en-US"/>
           </a:p>
@@ -802,7 +808,7 @@
             <a:fld id="{1D8BD707-D9CF-40AE-B4C6-C98DA3205C09}" type="datetimeFigureOut">
               <a:rPr lang="en-US" smtClean="0"/>
               <a:pPr/>
-              <a:t>12/27/2016</a:t>
+              <a:t>12/28/2016</a:t>
             </a:fld>
             <a:endParaRPr lang="en-US"/>
           </a:p>
@@ -1045,7 +1051,7 @@
             <a:fld id="{1D8BD707-D9CF-40AE-B4C6-C98DA3205C09}" type="datetimeFigureOut">
               <a:rPr lang="en-US" smtClean="0"/>
               <a:pPr/>
-              <a:t>12/27/2016</a:t>
+              <a:t>12/28/2016</a:t>
             </a:fld>
             <a:endParaRPr lang="en-US"/>
           </a:p>
@@ -1330,7 +1336,7 @@
             <a:fld id="{1D8BD707-D9CF-40AE-B4C6-C98DA3205C09}" type="datetimeFigureOut">
               <a:rPr lang="en-US" smtClean="0"/>
               <a:pPr/>
-              <a:t>12/27/2016</a:t>
+              <a:t>12/28/2016</a:t>
             </a:fld>
             <a:endParaRPr lang="en-US"/>
           </a:p>
@@ -1749,7 +1755,7 @@
             <a:fld id="{1D8BD707-D9CF-40AE-B4C6-C98DA3205C09}" type="datetimeFigureOut">
               <a:rPr lang="en-US" smtClean="0"/>
               <a:pPr/>
-              <a:t>12/27/2016</a:t>
+              <a:t>12/28/2016</a:t>
             </a:fld>
             <a:endParaRPr lang="en-US"/>
           </a:p>
@@ -1864,7 +1870,7 @@
             <a:fld id="{1D8BD707-D9CF-40AE-B4C6-C98DA3205C09}" type="datetimeFigureOut">
               <a:rPr lang="en-US" smtClean="0"/>
               <a:pPr/>
-              <a:t>12/27/2016</a:t>
+              <a:t>12/28/2016</a:t>
             </a:fld>
             <a:endParaRPr lang="en-US"/>
           </a:p>
@@ -1956,7 +1962,7 @@
             <a:fld id="{1D8BD707-D9CF-40AE-B4C6-C98DA3205C09}" type="datetimeFigureOut">
               <a:rPr lang="en-US" smtClean="0"/>
               <a:pPr/>
-              <a:t>12/27/2016</a:t>
+              <a:t>12/28/2016</a:t>
             </a:fld>
             <a:endParaRPr lang="en-US"/>
           </a:p>
@@ -2230,7 +2236,7 @@
             <a:fld id="{1D8BD707-D9CF-40AE-B4C6-C98DA3205C09}" type="datetimeFigureOut">
               <a:rPr lang="en-US" smtClean="0"/>
               <a:pPr/>
-              <a:t>12/27/2016</a:t>
+              <a:t>12/28/2016</a:t>
             </a:fld>
             <a:endParaRPr lang="en-US"/>
           </a:p>
@@ -2480,7 +2486,7 @@
             <a:fld id="{1D8BD707-D9CF-40AE-B4C6-C98DA3205C09}" type="datetimeFigureOut">
               <a:rPr lang="en-US" smtClean="0"/>
               <a:pPr/>
-              <a:t>12/27/2016</a:t>
+              <a:t>12/28/2016</a:t>
             </a:fld>
             <a:endParaRPr lang="en-US"/>
           </a:p>
@@ -2690,7 +2696,7 @@
             <a:fld id="{1D8BD707-D9CF-40AE-B4C6-C98DA3205C09}" type="datetimeFigureOut">
               <a:rPr lang="en-US" smtClean="0"/>
               <a:pPr/>
-              <a:t>12/27/2016</a:t>
+              <a:t>12/28/2016</a:t>
             </a:fld>
             <a:endParaRPr lang="en-US"/>
           </a:p>
@@ -3101,8 +3107,8 @@
         </p:nvSpPr>
         <p:spPr>
           <a:xfrm>
-            <a:off x="1371600" y="1524000"/>
-            <a:ext cx="6400800" cy="4114800"/>
+            <a:off x="762000" y="1295400"/>
+            <a:ext cx="7848600" cy="4876800"/>
           </a:xfrm>
         </p:spPr>
         <p:txBody>
@@ -3113,15 +3119,95 @@
           <a:p>
             <a:pPr algn="l"/>
             <a:r>
-              <a:rPr lang="ru-RU" dirty="0" smtClean="0"/>
-              <a:t>Когда нам необходимо обеспечить контекст.</a:t>
+              <a:rPr lang="ru-RU" sz="2300" dirty="0">
+                <a:solidFill>
+                  <a:schemeClr val="tx1"/>
+                </a:solidFill>
+              </a:rPr>
+              <a:t>Когда использовать:</a:t>
             </a:r>
           </a:p>
           <a:p>
             <a:pPr algn="l"/>
-            <a:r>
-              <a:rPr lang="ru-RU" dirty="0" smtClean="0"/>
-              <a:t>Допустим, есть дочернее окно приложения. В зависимости от входных данных (которые задаются на этапе выполнения), поведение окна должно определенным образом различаться.</a:t>
+            <a:endParaRPr lang="ru-RU" sz="2300" dirty="0">
+              <a:solidFill>
+                <a:schemeClr val="tx1"/>
+              </a:solidFill>
+            </a:endParaRPr>
+          </a:p>
+          <a:p>
+            <a:pPr marL="457200" indent="-457200" algn="l">
+              <a:buFont typeface="Arial" panose="020B0604020202020204" pitchFamily="34" charset="0"/>
+              <a:buChar char="•"/>
+            </a:pPr>
+            <a:r>
+              <a:rPr lang="ru-RU" sz="2300" dirty="0">
+                <a:solidFill>
+                  <a:schemeClr val="tx1"/>
+                </a:solidFill>
+              </a:rPr>
+              <a:t>Когда поведение одинаковых компонентов зависит от времени выполнения.</a:t>
+            </a:r>
+          </a:p>
+          <a:p>
+            <a:pPr marL="457200" indent="-457200" algn="l">
+              <a:buFont typeface="Arial" panose="020B0604020202020204" pitchFamily="34" charset="0"/>
+              <a:buChar char="•"/>
+            </a:pPr>
+            <a:r>
+              <a:rPr lang="ru-RU" sz="2300" dirty="0">
+                <a:solidFill>
+                  <a:schemeClr val="tx1"/>
+                </a:solidFill>
+              </a:rPr>
+              <a:t>Когда производятся вычисления, принимающие на вход данные времени выполнения.</a:t>
+            </a:r>
+          </a:p>
+          <a:p>
+            <a:pPr marL="457200" indent="-457200" algn="l">
+              <a:buFont typeface="Arial" panose="020B0604020202020204" pitchFamily="34" charset="0"/>
+              <a:buChar char="•"/>
+            </a:pPr>
+            <a:r>
+              <a:rPr lang="ru-RU" sz="2300" dirty="0">
+                <a:solidFill>
+                  <a:schemeClr val="tx1"/>
+                </a:solidFill>
+              </a:rPr>
+              <a:t>Когда необходимо произвести очистку ряда объектов.</a:t>
+            </a:r>
+          </a:p>
+          <a:p>
+            <a:pPr algn="l"/>
+            <a:r>
+              <a:rPr lang="ru-RU" sz="2300" dirty="0">
+                <a:solidFill>
+                  <a:schemeClr val="tx1"/>
+                </a:solidFill>
+              </a:rPr>
+              <a:t>Пример:</a:t>
+            </a:r>
+          </a:p>
+          <a:p>
+            <a:pPr algn="l"/>
+            <a:r>
+              <a:rPr lang="ru-RU" sz="2300" dirty="0">
+                <a:solidFill>
+                  <a:schemeClr val="tx1"/>
+                </a:solidFill>
+              </a:rPr>
+              <a:t>Настольное приложение. Есть главное и дочернее окна.</a:t>
+            </a:r>
+          </a:p>
+          <a:p>
+            <a:pPr algn="l"/>
+            <a:r>
+              <a:rPr lang="ru-RU" sz="2300" dirty="0">
+                <a:solidFill>
+                  <a:schemeClr val="tx1"/>
+                </a:solidFill>
+              </a:rPr>
+              <a:t>В зависимости от входных данных (которые задаются на этапе выполнения), поведение окна должно определенным образом различаться.</a:t>
             </a:r>
           </a:p>
           <a:p>
@@ -3176,7 +3262,11 @@
           <a:p>
             <a:r>
               <a:rPr lang="ru-RU" dirty="0" smtClean="0"/>
-              <a:t>Вложенные скопы</a:t>
+              <a:t>Вложенные </a:t>
+            </a:r>
+            <a:r>
+              <a:rPr lang="ru-RU" dirty="0" smtClean="0"/>
+              <a:t>скоупы</a:t>
             </a:r>
             <a:endParaRPr lang="ru-RU" dirty="0"/>
           </a:p>
@@ -3199,12 +3289,46 @@
           </a:bodyPr>
           <a:lstStyle/>
           <a:p>
+            <a:pPr marL="0" indent="0" algn="ctr">
+              <a:buNone/>
+            </a:pPr>
+            <a:r>
+              <a:rPr lang="ru-RU" dirty="0" smtClean="0">
+                <a:solidFill>
+                  <a:srgbClr val="FF0000"/>
+                </a:solidFill>
+              </a:rPr>
+              <a:t>Неудачное решение</a:t>
+            </a:r>
+            <a:endParaRPr lang="ru-RU" dirty="0" smtClean="0">
+              <a:solidFill>
+                <a:srgbClr val="FF0000"/>
+              </a:solidFill>
+            </a:endParaRPr>
+          </a:p>
+          <a:p>
             <a:pPr marL="0" indent="0">
               <a:buNone/>
             </a:pPr>
             <a:r>
               <a:rPr lang="ru-RU" dirty="0" smtClean="0"/>
-              <a:t>Первое решение (неудачное):</a:t>
+              <a:t>Зарегестрировать все зависимости в основном скоупе (контейнере). В зависимости от исходных данных создавать экземпляр дочернего </a:t>
+            </a:r>
+            <a:r>
+              <a:rPr lang="ru-RU" dirty="0" smtClean="0"/>
+              <a:t>окна</a:t>
+            </a:r>
+            <a:r>
+              <a:rPr lang="en-US" dirty="0" smtClean="0"/>
+              <a:t> </a:t>
+            </a:r>
+            <a:r>
+              <a:rPr lang="ru-RU" dirty="0" smtClean="0"/>
+              <a:t>явно </a:t>
+            </a:r>
+            <a:r>
+              <a:rPr lang="ru-RU" dirty="0" smtClean="0"/>
+              <a:t>через конструктор и передавая ему нужные зависимости (исходя из введенных пользователем данных).</a:t>
             </a:r>
           </a:p>
           <a:p>
@@ -3213,31 +3337,25 @@
             </a:pPr>
             <a:r>
               <a:rPr lang="ru-RU" dirty="0" smtClean="0"/>
-              <a:t>Зарегестрировать все зависимости в основном скоупе (контейнере). В зависимости от исходных данных создавать экземпляр дочернего явно через конструктор и передавая ему нужные зависимости (исходя из введенных пользователем данных).</a:t>
+              <a:t>Плюсы: </a:t>
+            </a:r>
+          </a:p>
+          <a:p>
+            <a:r>
+              <a:rPr lang="ru-RU" dirty="0" smtClean="0"/>
+              <a:t>Мы решили задачу</a:t>
+            </a:r>
+          </a:p>
+          <a:p>
+            <a:r>
+              <a:rPr lang="ru-RU" dirty="0" smtClean="0"/>
+              <a:t>Зависимости (за исключение одной) мы разрешали через контейнер.</a:t>
             </a:r>
           </a:p>
           <a:p>
             <a:pPr marL="0" indent="0">
               <a:buNone/>
             </a:pPr>
-            <a:r>
-              <a:rPr lang="ru-RU" dirty="0" smtClean="0"/>
-              <a:t>Плюсы: </a:t>
-            </a:r>
-          </a:p>
-          <a:p>
-            <a:r>
-              <a:rPr lang="ru-RU" dirty="0" smtClean="0"/>
-              <a:t>Мы решили задачу</a:t>
-            </a:r>
-          </a:p>
-          <a:p>
-            <a:r>
-              <a:rPr lang="ru-RU" dirty="0" smtClean="0"/>
-              <a:t>Зависимости (за исключение одной) мы разрешали через контейнер.</a:t>
-            </a:r>
-          </a:p>
-          <a:p>
             <a:r>
               <a:rPr lang="ru-RU" dirty="0" smtClean="0"/>
               <a:t>Минусы:</a:t>
@@ -3252,6 +3370,10 @@
               <a:rPr lang="en-US" dirty="0" smtClean="0"/>
               <a:t>new</a:t>
             </a:r>
+            <a:r>
+              <a:rPr lang="ru-RU" dirty="0" smtClean="0"/>
+              <a:t>.</a:t>
+            </a:r>
             <a:endParaRPr lang="ru-RU" dirty="0"/>
           </a:p>
           <a:p>
@@ -3265,25 +3387,49 @@
             </a:r>
             <a:r>
               <a:rPr lang="ru-RU" dirty="0" smtClean="0"/>
-              <a:t>, потому что его смысл в том, чтобы снять себя ответственность создания экземпляров зависимостей и тем самым упростить архитектуру.</a:t>
-            </a:r>
-          </a:p>
-          <a:p>
-            <a:r>
-              <a:rPr lang="ru-RU" dirty="0" smtClean="0"/>
-              <a:t>Мы не сможем использовать обработку контейнером тех зависимостей, которые реализуют </a:t>
+              <a:t>, потому что его смысл в том, чтобы </a:t>
+            </a:r>
+            <a:r>
+              <a:rPr lang="ru-RU" dirty="0" smtClean="0"/>
+              <a:t>снять с </a:t>
+            </a:r>
+            <a:r>
+              <a:rPr lang="ru-RU" dirty="0" smtClean="0"/>
+              <a:t>себя ответственность создания экземпляров зависимостей и тем самым упростить архитектуру.</a:t>
+            </a:r>
+          </a:p>
+          <a:p>
+            <a:r>
+              <a:rPr lang="ru-RU" dirty="0" smtClean="0"/>
+              <a:t>Мы не сможем использовать </a:t>
+            </a:r>
+            <a:r>
+              <a:rPr lang="ru-RU" dirty="0" smtClean="0"/>
+              <a:t>механизм очистки </a:t>
             </a:r>
             <a:r>
               <a:rPr lang="en-US" dirty="0" err="1" smtClean="0"/>
-              <a:t>I</a:t>
-            </a:r>
-            <a:r>
-              <a:rPr lang="en-US" dirty="0" err="1"/>
-              <a:t>D</a:t>
-            </a:r>
-            <a:r>
-              <a:rPr lang="en-US" dirty="0" err="1" smtClean="0"/>
-              <a:t>isposable</a:t>
+              <a:t>IDisposable</a:t>
+            </a:r>
+            <a:r>
+              <a:rPr lang="ru-RU" dirty="0" smtClean="0"/>
+              <a:t> </a:t>
+            </a:r>
+            <a:r>
+              <a:rPr lang="ru-RU" dirty="0" smtClean="0"/>
+              <a:t>той</a:t>
+            </a:r>
+            <a:r>
+              <a:rPr lang="en-US" dirty="0" smtClean="0"/>
+              <a:t> </a:t>
+            </a:r>
+            <a:r>
+              <a:rPr lang="ru-RU" dirty="0" smtClean="0"/>
+              <a:t>зависимости, которая создана через </a:t>
+            </a:r>
+            <a:r>
+              <a:rPr lang="en-US" dirty="0" smtClean="0"/>
+              <a:t>new</a:t>
             </a:r>
             <a:r>
               <a:rPr lang="ru-RU" dirty="0" smtClean="0"/>
@@ -3294,11 +3440,7 @@
           <a:p>
             <a:r>
               <a:rPr lang="ru-RU" dirty="0" smtClean="0"/>
-              <a:t>Если различие в поведении будет реализовано в нескольких компонентах, </a:t>
-            </a:r>
-            <a:r>
-              <a:rPr lang="ru-RU" smtClean="0"/>
-              <a:t>то наша ручная процедура разрешения зависимостей будет усложняться.</a:t>
+              <a:t>Если различие в поведении будет реализовано в нескольких компонентах, то наша ручная процедура разрешения зависимостей будет усложняться.</a:t>
             </a:r>
             <a:endParaRPr lang="ru-RU" dirty="0"/>
           </a:p>
@@ -3346,6 +3488,155 @@
         </p:nvSpPr>
         <p:spPr/>
         <p:txBody>
+          <a:bodyPr/>
+          <a:lstStyle/>
+          <a:p>
+            <a:r>
+              <a:rPr lang="ru-RU" dirty="0" smtClean="0"/>
+              <a:t>Вложенные скоупы</a:t>
+            </a:r>
+            <a:endParaRPr lang="ru-RU" dirty="0"/>
+          </a:p>
+        </p:txBody>
+      </p:sp>
+      <p:sp>
+        <p:nvSpPr>
+          <p:cNvPr id="3" name="Content Placeholder 2"/>
+          <p:cNvSpPr>
+            <a:spLocks noGrp="1"/>
+          </p:cNvSpPr>
+          <p:nvPr>
+            <p:ph idx="1"/>
+          </p:nvPr>
+        </p:nvSpPr>
+        <p:spPr/>
+        <p:txBody>
+          <a:bodyPr>
+            <a:normAutofit fontScale="62500" lnSpcReduction="20000"/>
+          </a:bodyPr>
+          <a:lstStyle/>
+          <a:p>
+            <a:pPr marL="0" indent="0" algn="ctr">
+              <a:buNone/>
+            </a:pPr>
+            <a:r>
+              <a:rPr lang="ru-RU" dirty="0" smtClean="0">
+                <a:solidFill>
+                  <a:srgbClr val="00B050"/>
+                </a:solidFill>
+              </a:rPr>
+              <a:t>Удачное решение</a:t>
+            </a:r>
+          </a:p>
+          <a:p>
+            <a:pPr marL="0" indent="0">
+              <a:buNone/>
+            </a:pPr>
+            <a:r>
+              <a:rPr lang="ru-RU" dirty="0" smtClean="0"/>
+              <a:t>Использование вложенных скоупов.</a:t>
+            </a:r>
+          </a:p>
+          <a:p>
+            <a:pPr marL="0" indent="0">
+              <a:buNone/>
+            </a:pPr>
+            <a:r>
+              <a:rPr lang="ru-RU" dirty="0" smtClean="0"/>
+              <a:t>Регистрация зависимостей осуществляется в соответсвтующих скоупах. Компоненты дочернего окна регистрируются в отдельном вложенном скоупе. Скоуп конфигурируется на момент выполнения, когда есть все необходимые данные (в отличие от первого решения, где конфигурирование происходит на момент запуска приложения).</a:t>
+            </a:r>
+          </a:p>
+          <a:p>
+            <a:pPr marL="0" indent="0">
+              <a:buNone/>
+            </a:pPr>
+            <a:r>
+              <a:rPr lang="ru-RU" dirty="0" smtClean="0"/>
+              <a:t>Минусы:</a:t>
+            </a:r>
+          </a:p>
+          <a:p>
+            <a:r>
+              <a:rPr lang="ru-RU" dirty="0" smtClean="0"/>
+              <a:t>На первый взгляд это может показаться довольно сложным и запутанным приемом.</a:t>
+            </a:r>
+          </a:p>
+          <a:p>
+            <a:pPr marL="0" indent="0">
+              <a:buNone/>
+            </a:pPr>
+            <a:r>
+              <a:rPr lang="ru-RU" dirty="0" smtClean="0"/>
+              <a:t>Плюсы:</a:t>
+            </a:r>
+          </a:p>
+          <a:p>
+            <a:r>
+              <a:rPr lang="ru-RU" dirty="0" smtClean="0"/>
+              <a:t>Нет ни одного оператора </a:t>
+            </a:r>
+            <a:r>
+              <a:rPr lang="en-US" dirty="0" smtClean="0"/>
+              <a:t>new</a:t>
+            </a:r>
+          </a:p>
+          <a:p>
+            <a:r>
+              <a:rPr lang="ru-RU" dirty="0" smtClean="0"/>
+              <a:t>Нет передачи контекстно-зависимых компонентов через параметры методов</a:t>
+            </a:r>
+          </a:p>
+          <a:p>
+            <a:r>
+              <a:rPr lang="ru-RU" dirty="0" smtClean="0"/>
+              <a:t>Простая регистрация и разрешение зависимостей.</a:t>
+            </a:r>
+            <a:endParaRPr lang="ru-RU" dirty="0"/>
+          </a:p>
+        </p:txBody>
+      </p:sp>
+    </p:spTree>
+    <p:extLst>
+      <p:ext uri="{BB962C8B-B14F-4D97-AF65-F5344CB8AC3E}">
+        <p14:creationId xmlns:p14="http://schemas.microsoft.com/office/powerpoint/2010/main" val="4098335358"/>
+      </p:ext>
+    </p:extLst>
+  </p:cSld>
+  <p:clrMapOvr>
+    <a:masterClrMapping/>
+  </p:clrMapOvr>
+</p:sld>
+</file>
+
+<file path=ppt/slides/slide4.xml><?xml version="1.0" encoding="utf-8"?>
+<p:sld xmlns:a="http://schemas.openxmlformats.org/drawingml/2006/main" xmlns:r="http://schemas.openxmlformats.org/officeDocument/2006/relationships" xmlns:p="http://schemas.openxmlformats.org/presentationml/2006/main">
+  <p:cSld>
+    <p:spTree>
+      <p:nvGrpSpPr>
+        <p:cNvPr id="1" name=""/>
+        <p:cNvGrpSpPr/>
+        <p:nvPr/>
+      </p:nvGrpSpPr>
+      <p:grpSpPr>
+        <a:xfrm>
+          <a:off x="0" y="0"/>
+          <a:ext cx="0" cy="0"/>
+          <a:chOff x="0" y="0"/>
+          <a:chExt cx="0" cy="0"/>
+        </a:xfrm>
+      </p:grpSpPr>
+      <p:sp>
+        <p:nvSpPr>
+          <p:cNvPr id="2" name="Title 1"/>
+          <p:cNvSpPr>
+            <a:spLocks noGrp="1"/>
+          </p:cNvSpPr>
+          <p:nvPr>
+            <p:ph type="title"/>
+          </p:nvPr>
+        </p:nvSpPr>
+        <p:spPr/>
+        <p:txBody>
           <a:bodyPr>
             <a:normAutofit fontScale="90000"/>
           </a:bodyPr>
@@ -3353,11 +3644,7 @@
           <a:p>
             <a:r>
               <a:rPr lang="ru-RU" dirty="0" smtClean="0"/>
-              <a:t>Вложенные </a:t>
-            </a:r>
-            <a:r>
-              <a:rPr lang="ru-RU" dirty="0" smtClean="0"/>
-              <a:t>скоупы</a:t>
+              <a:t>Вложенные скоупы</a:t>
             </a:r>
             <a:r>
               <a:rPr lang="en-US" dirty="0" smtClean="0"/>
@@ -3391,7 +3678,7 @@
         <p:spPr/>
         <p:txBody>
           <a:bodyPr>
-            <a:normAutofit fontScale="85000" lnSpcReduction="20000"/>
+            <a:normAutofit fontScale="70000" lnSpcReduction="20000"/>
           </a:bodyPr>
           <a:lstStyle/>
           <a:p>
@@ -3412,19 +3699,11 @@
             </a:r>
             <a:r>
               <a:rPr lang="ru-RU" dirty="0" smtClean="0"/>
-              <a:t>. Теперь </a:t>
-            </a:r>
-            <a:r>
-              <a:rPr lang="en-US" dirty="0" err="1" smtClean="0"/>
-              <a:t>HeaderViewModel</a:t>
-            </a:r>
-            <a:r>
-              <a:rPr lang="en-US" dirty="0" smtClean="0"/>
-              <a:t> </a:t>
-            </a:r>
-            <a:r>
-              <a:rPr lang="ru-RU" dirty="0" smtClean="0"/>
-              <a:t>не хранит в себе текст. Чтобы поддержать принцип единственной ответственности, мы разместили текст в </a:t>
+              <a:t>. </a:t>
+            </a:r>
+            <a:r>
+              <a:rPr lang="ru-RU" dirty="0" smtClean="0"/>
+              <a:t>Чтобы поддержать принцип единственной ответственности, мы разместили текст в </a:t>
             </a:r>
             <a:r>
               <a:rPr lang="en-US" dirty="0" err="1" smtClean="0"/>
@@ -3447,8 +3726,25 @@
               <a:t>ChildWindowViewModel</a:t>
             </a:r>
             <a:r>
+              <a:rPr lang="ru-RU" dirty="0" smtClean="0"/>
+              <a:t> и поэтому создание ее экземпляра становится очень сложным</a:t>
+            </a:r>
+            <a:r>
+              <a:rPr lang="ru-RU" dirty="0" smtClean="0"/>
+              <a:t>.</a:t>
+            </a:r>
+          </a:p>
+          <a:p>
+            <a:pPr marL="0" indent="0">
+              <a:buNone/>
+            </a:pPr>
+            <a:r>
+              <a:rPr lang="ru-RU" dirty="0" smtClean="0"/>
+              <a:t>Использование вложенных скоупов не добавляет сложности ни в регистрацию, ни в разрешение </a:t>
+            </a:r>
+            <a:r>
               <a:rPr lang="ru-RU" smtClean="0"/>
-              <a:t> и поэтому создание ее экземпляра становится очень сложным.</a:t>
+              <a:t>зависимостей (ответственность за создание экземпляров полностью на контейнере).</a:t>
             </a:r>
             <a:endParaRPr lang="ru-RU" dirty="0"/>
           </a:p>
@@ -3458,6 +3754,442 @@
     <p:extLst>
       <p:ext uri="{BB962C8B-B14F-4D97-AF65-F5344CB8AC3E}">
         <p14:creationId xmlns:p14="http://schemas.microsoft.com/office/powerpoint/2010/main" val="1109283116"/>
+      </p:ext>
+    </p:extLst>
+  </p:cSld>
+  <p:clrMapOvr>
+    <a:masterClrMapping/>
+  </p:clrMapOvr>
+</p:sld>
+</file>
+
+<file path=ppt/slides/slide5.xml><?xml version="1.0" encoding="utf-8"?>
+<p:sld xmlns:a="http://schemas.openxmlformats.org/drawingml/2006/main" xmlns:r="http://schemas.openxmlformats.org/officeDocument/2006/relationships" xmlns:p="http://schemas.openxmlformats.org/presentationml/2006/main">
+  <p:cSld>
+    <p:spTree>
+      <p:nvGrpSpPr>
+        <p:cNvPr id="1" name=""/>
+        <p:cNvGrpSpPr/>
+        <p:nvPr/>
+      </p:nvGrpSpPr>
+      <p:grpSpPr>
+        <a:xfrm>
+          <a:off x="0" y="0"/>
+          <a:ext cx="0" cy="0"/>
+          <a:chOff x="0" y="0"/>
+          <a:chExt cx="0" cy="0"/>
+        </a:xfrm>
+      </p:grpSpPr>
+      <p:sp>
+        <p:nvSpPr>
+          <p:cNvPr id="2" name="Title 1"/>
+          <p:cNvSpPr>
+            <a:spLocks noGrp="1"/>
+          </p:cNvSpPr>
+          <p:nvPr>
+            <p:ph type="title"/>
+          </p:nvPr>
+        </p:nvSpPr>
+        <p:spPr/>
+        <p:txBody>
+          <a:bodyPr>
+            <a:normAutofit fontScale="90000"/>
+          </a:bodyPr>
+          <a:lstStyle/>
+          <a:p>
+            <a:r>
+              <a:rPr lang="ru-RU" dirty="0" smtClean="0"/>
+              <a:t>Вложенные скоупы</a:t>
+            </a:r>
+            <a:br>
+              <a:rPr lang="ru-RU" dirty="0" smtClean="0"/>
+            </a:br>
+            <a:r>
+              <a:rPr lang="ru-RU" dirty="0" smtClean="0"/>
+              <a:t>(в разработке)</a:t>
+            </a:r>
+            <a:endParaRPr lang="ru-RU" dirty="0"/>
+          </a:p>
+        </p:txBody>
+      </p:sp>
+      <p:sp>
+        <p:nvSpPr>
+          <p:cNvPr id="3" name="Content Placeholder 2"/>
+          <p:cNvSpPr>
+            <a:spLocks noGrp="1"/>
+          </p:cNvSpPr>
+          <p:nvPr>
+            <p:ph idx="1"/>
+          </p:nvPr>
+        </p:nvSpPr>
+        <p:spPr/>
+        <p:txBody>
+          <a:bodyPr/>
+          <a:lstStyle/>
+          <a:p>
+            <a:pPr marL="0" indent="0">
+              <a:buNone/>
+            </a:pPr>
+            <a:r>
+              <a:rPr lang="ru-RU" dirty="0" smtClean="0"/>
+              <a:t>Использование на сервере при создании контекста для запроса</a:t>
+            </a:r>
+            <a:endParaRPr lang="ru-RU" dirty="0"/>
+          </a:p>
+        </p:txBody>
+      </p:sp>
+    </p:spTree>
+    <p:extLst>
+      <p:ext uri="{BB962C8B-B14F-4D97-AF65-F5344CB8AC3E}">
+        <p14:creationId xmlns:p14="http://schemas.microsoft.com/office/powerpoint/2010/main" val="3662241724"/>
+      </p:ext>
+    </p:extLst>
+  </p:cSld>
+  <p:clrMapOvr>
+    <a:masterClrMapping/>
+  </p:clrMapOvr>
+</p:sld>
+</file>
+
+<file path=ppt/slides/slide6.xml><?xml version="1.0" encoding="utf-8"?>
+<p:sld xmlns:a="http://schemas.openxmlformats.org/drawingml/2006/main" xmlns:r="http://schemas.openxmlformats.org/officeDocument/2006/relationships" xmlns:p="http://schemas.openxmlformats.org/presentationml/2006/main">
+  <p:cSld>
+    <p:spTree>
+      <p:nvGrpSpPr>
+        <p:cNvPr id="1" name=""/>
+        <p:cNvGrpSpPr/>
+        <p:nvPr/>
+      </p:nvGrpSpPr>
+      <p:grpSpPr>
+        <a:xfrm>
+          <a:off x="0" y="0"/>
+          <a:ext cx="0" cy="0"/>
+          <a:chOff x="0" y="0"/>
+          <a:chExt cx="0" cy="0"/>
+        </a:xfrm>
+      </p:grpSpPr>
+      <p:sp>
+        <p:nvSpPr>
+          <p:cNvPr id="2" name="Title 1"/>
+          <p:cNvSpPr>
+            <a:spLocks noGrp="1"/>
+          </p:cNvSpPr>
+          <p:nvPr>
+            <p:ph type="title"/>
+          </p:nvPr>
+        </p:nvSpPr>
+        <p:spPr/>
+        <p:txBody>
+          <a:bodyPr>
+            <a:normAutofit fontScale="90000"/>
+          </a:bodyPr>
+          <a:lstStyle/>
+          <a:p>
+            <a:r>
+              <a:rPr lang="ru-RU" dirty="0" smtClean="0"/>
+              <a:t>Вложенные скоупы</a:t>
+            </a:r>
+            <a:br>
+              <a:rPr lang="ru-RU" dirty="0" smtClean="0"/>
+            </a:br>
+            <a:r>
+              <a:rPr lang="ru-RU" dirty="0" smtClean="0"/>
+              <a:t>(в разработке)</a:t>
+            </a:r>
+            <a:endParaRPr lang="ru-RU" dirty="0"/>
+          </a:p>
+        </p:txBody>
+      </p:sp>
+      <p:sp>
+        <p:nvSpPr>
+          <p:cNvPr id="3" name="Content Placeholder 2"/>
+          <p:cNvSpPr>
+            <a:spLocks noGrp="1"/>
+          </p:cNvSpPr>
+          <p:nvPr>
+            <p:ph idx="1"/>
+          </p:nvPr>
+        </p:nvSpPr>
+        <p:spPr/>
+        <p:txBody>
+          <a:bodyPr/>
+          <a:lstStyle/>
+          <a:p>
+            <a:pPr marL="0" indent="0">
+              <a:buNone/>
+            </a:pPr>
+            <a:r>
+              <a:rPr lang="ru-RU" dirty="0" smtClean="0"/>
+              <a:t>Использование механизма очистки</a:t>
+            </a:r>
+            <a:endParaRPr lang="ru-RU" dirty="0"/>
+          </a:p>
+        </p:txBody>
+      </p:sp>
+    </p:spTree>
+    <p:extLst>
+      <p:ext uri="{BB962C8B-B14F-4D97-AF65-F5344CB8AC3E}">
+        <p14:creationId xmlns:p14="http://schemas.microsoft.com/office/powerpoint/2010/main" val="1722728286"/>
+      </p:ext>
+    </p:extLst>
+  </p:cSld>
+  <p:clrMapOvr>
+    <a:masterClrMapping/>
+  </p:clrMapOvr>
+</p:sld>
+</file>
+
+<file path=ppt/slides/slide7.xml><?xml version="1.0" encoding="utf-8"?>
+<p:sld xmlns:a="http://schemas.openxmlformats.org/drawingml/2006/main" xmlns:r="http://schemas.openxmlformats.org/officeDocument/2006/relationships" xmlns:p="http://schemas.openxmlformats.org/presentationml/2006/main">
+  <p:cSld>
+    <p:spTree>
+      <p:nvGrpSpPr>
+        <p:cNvPr id="1" name=""/>
+        <p:cNvGrpSpPr/>
+        <p:nvPr/>
+      </p:nvGrpSpPr>
+      <p:grpSpPr>
+        <a:xfrm>
+          <a:off x="0" y="0"/>
+          <a:ext cx="0" cy="0"/>
+          <a:chOff x="0" y="0"/>
+          <a:chExt cx="0" cy="0"/>
+        </a:xfrm>
+      </p:grpSpPr>
+      <p:sp>
+        <p:nvSpPr>
+          <p:cNvPr id="2" name="Title 1"/>
+          <p:cNvSpPr>
+            <a:spLocks noGrp="1"/>
+          </p:cNvSpPr>
+          <p:nvPr>
+            <p:ph type="title"/>
+          </p:nvPr>
+        </p:nvSpPr>
+        <p:spPr/>
+        <p:txBody>
+          <a:bodyPr>
+            <a:normAutofit fontScale="90000"/>
+          </a:bodyPr>
+          <a:lstStyle/>
+          <a:p>
+            <a:r>
+              <a:rPr lang="ru-RU" dirty="0" smtClean="0"/>
+              <a:t>Автоматические фабрики</a:t>
+            </a:r>
+            <a:br>
+              <a:rPr lang="ru-RU" dirty="0" smtClean="0"/>
+            </a:br>
+            <a:r>
+              <a:rPr lang="ru-RU" dirty="0" smtClean="0"/>
+              <a:t>(в разработке)</a:t>
+            </a:r>
+            <a:endParaRPr lang="ru-RU" dirty="0"/>
+          </a:p>
+        </p:txBody>
+      </p:sp>
+      <p:sp>
+        <p:nvSpPr>
+          <p:cNvPr id="3" name="Content Placeholder 2"/>
+          <p:cNvSpPr>
+            <a:spLocks noGrp="1"/>
+          </p:cNvSpPr>
+          <p:nvPr>
+            <p:ph idx="1"/>
+          </p:nvPr>
+        </p:nvSpPr>
+        <p:spPr/>
+        <p:txBody>
+          <a:bodyPr/>
+          <a:lstStyle/>
+          <a:p>
+            <a:pPr marL="0" indent="0">
+              <a:buNone/>
+            </a:pPr>
+            <a:endParaRPr lang="ru-RU" dirty="0"/>
+          </a:p>
+        </p:txBody>
+      </p:sp>
+    </p:spTree>
+    <p:extLst>
+      <p:ext uri="{BB962C8B-B14F-4D97-AF65-F5344CB8AC3E}">
+        <p14:creationId xmlns:p14="http://schemas.microsoft.com/office/powerpoint/2010/main" val="250754920"/>
+      </p:ext>
+    </p:extLst>
+  </p:cSld>
+  <p:clrMapOvr>
+    <a:masterClrMapping/>
+  </p:clrMapOvr>
+</p:sld>
+</file>
+
+<file path=ppt/slides/slide8.xml><?xml version="1.0" encoding="utf-8"?>
+<p:sld xmlns:a="http://schemas.openxmlformats.org/drawingml/2006/main" xmlns:r="http://schemas.openxmlformats.org/officeDocument/2006/relationships" xmlns:p="http://schemas.openxmlformats.org/presentationml/2006/main">
+  <p:cSld>
+    <p:spTree>
+      <p:nvGrpSpPr>
+        <p:cNvPr id="1" name=""/>
+        <p:cNvGrpSpPr/>
+        <p:nvPr/>
+      </p:nvGrpSpPr>
+      <p:grpSpPr>
+        <a:xfrm>
+          <a:off x="0" y="0"/>
+          <a:ext cx="0" cy="0"/>
+          <a:chOff x="0" y="0"/>
+          <a:chExt cx="0" cy="0"/>
+        </a:xfrm>
+      </p:grpSpPr>
+      <p:sp>
+        <p:nvSpPr>
+          <p:cNvPr id="2" name="Title 1"/>
+          <p:cNvSpPr>
+            <a:spLocks noGrp="1"/>
+          </p:cNvSpPr>
+          <p:nvPr>
+            <p:ph type="title"/>
+          </p:nvPr>
+        </p:nvSpPr>
+        <p:spPr/>
+        <p:txBody>
+          <a:bodyPr>
+            <a:normAutofit fontScale="90000"/>
+          </a:bodyPr>
+          <a:lstStyle/>
+          <a:p>
+            <a:r>
+              <a:rPr lang="ru-RU" dirty="0" smtClean="0"/>
+              <a:t>Работа со временем жизни</a:t>
+            </a:r>
+            <a:br>
+              <a:rPr lang="ru-RU" dirty="0" smtClean="0"/>
+            </a:br>
+            <a:r>
+              <a:rPr lang="ru-RU" dirty="0" smtClean="0"/>
+              <a:t>(в разработке)</a:t>
+            </a:r>
+            <a:endParaRPr lang="ru-RU" dirty="0"/>
+          </a:p>
+        </p:txBody>
+      </p:sp>
+      <p:sp>
+        <p:nvSpPr>
+          <p:cNvPr id="3" name="Content Placeholder 2"/>
+          <p:cNvSpPr>
+            <a:spLocks noGrp="1"/>
+          </p:cNvSpPr>
+          <p:nvPr>
+            <p:ph idx="1"/>
+          </p:nvPr>
+        </p:nvSpPr>
+        <p:spPr/>
+        <p:txBody>
+          <a:bodyPr/>
+          <a:lstStyle/>
+          <a:p>
+            <a:pPr marL="0" indent="0">
+              <a:buNone/>
+            </a:pPr>
+            <a:endParaRPr lang="ru-RU" dirty="0"/>
+          </a:p>
+        </p:txBody>
+      </p:sp>
+    </p:spTree>
+    <p:extLst>
+      <p:ext uri="{BB962C8B-B14F-4D97-AF65-F5344CB8AC3E}">
+        <p14:creationId xmlns:p14="http://schemas.microsoft.com/office/powerpoint/2010/main" val="2031874441"/>
+      </p:ext>
+    </p:extLst>
+  </p:cSld>
+  <p:clrMapOvr>
+    <a:masterClrMapping/>
+  </p:clrMapOvr>
+</p:sld>
+</file>
+
+<file path=ppt/slides/slide9.xml><?xml version="1.0" encoding="utf-8"?>
+<p:sld xmlns:a="http://schemas.openxmlformats.org/drawingml/2006/main" xmlns:r="http://schemas.openxmlformats.org/officeDocument/2006/relationships" xmlns:p="http://schemas.openxmlformats.org/presentationml/2006/main">
+  <p:cSld>
+    <p:spTree>
+      <p:nvGrpSpPr>
+        <p:cNvPr id="1" name=""/>
+        <p:cNvGrpSpPr/>
+        <p:nvPr/>
+      </p:nvGrpSpPr>
+      <p:grpSpPr>
+        <a:xfrm>
+          <a:off x="0" y="0"/>
+          <a:ext cx="0" cy="0"/>
+          <a:chOff x="0" y="0"/>
+          <a:chExt cx="0" cy="0"/>
+        </a:xfrm>
+      </p:grpSpPr>
+      <p:sp>
+        <p:nvSpPr>
+          <p:cNvPr id="2" name="Title 1"/>
+          <p:cNvSpPr>
+            <a:spLocks noGrp="1"/>
+          </p:cNvSpPr>
+          <p:nvPr>
+            <p:ph type="title"/>
+          </p:nvPr>
+        </p:nvSpPr>
+        <p:spPr/>
+        <p:txBody>
+          <a:bodyPr>
+            <a:normAutofit fontScale="90000"/>
+          </a:bodyPr>
+          <a:lstStyle/>
+          <a:p>
+            <a:r>
+              <a:rPr lang="en-US" dirty="0" smtClean="0"/>
+              <a:t>Disposable&lt;T&gt;. </a:t>
+            </a:r>
+            <a:r>
+              <a:rPr lang="en-US" dirty="0" err="1" smtClean="0"/>
+              <a:t>CompositeDisposable</a:t>
+            </a:r>
+            <a:r>
+              <a:rPr lang="en-US" dirty="0" smtClean="0"/>
+              <a:t/>
+            </a:r>
+            <a:br>
+              <a:rPr lang="en-US" dirty="0" smtClean="0"/>
+            </a:br>
+            <a:r>
+              <a:rPr lang="ru-RU" dirty="0" smtClean="0"/>
+              <a:t>(в разработке)</a:t>
+            </a:r>
+            <a:endParaRPr lang="ru-RU" dirty="0"/>
+          </a:p>
+        </p:txBody>
+      </p:sp>
+      <p:sp>
+        <p:nvSpPr>
+          <p:cNvPr id="3" name="Content Placeholder 2"/>
+          <p:cNvSpPr>
+            <a:spLocks noGrp="1"/>
+          </p:cNvSpPr>
+          <p:nvPr>
+            <p:ph idx="1"/>
+          </p:nvPr>
+        </p:nvSpPr>
+        <p:spPr/>
+        <p:txBody>
+          <a:bodyPr/>
+          <a:lstStyle/>
+          <a:p>
+            <a:pPr marL="0" indent="0">
+              <a:buNone/>
+            </a:pPr>
+            <a:endParaRPr lang="ru-RU" dirty="0"/>
+          </a:p>
+        </p:txBody>
+      </p:sp>
+    </p:spTree>
+    <p:extLst>
+      <p:ext uri="{BB962C8B-B14F-4D97-AF65-F5344CB8AC3E}">
+        <p14:creationId xmlns:p14="http://schemas.microsoft.com/office/powerpoint/2010/main" val="3482543496"/>
       </p:ext>
     </p:extLst>
   </p:cSld>

</xml_diff>